<commit_message>
resolved security group bug
</commit_message>
<xml_diff>
--- a/architecture.pptx
+++ b/architecture.pptx
@@ -104,6 +104,11 @@
       </a:defRPr>
     </a:lvl9pPr>
   </p:defaultTextStyle>
+  <p:extLst>
+    <p:ext uri="{EFAFB233-063F-42B5-8137-9DF3F51BA10A}">
+      <p15:sldGuideLst xmlns:p15="http://schemas.microsoft.com/office/powerpoint/2012/main"/>
+    </p:ext>
+  </p:extLst>
 </p:presentation>
 </file>
 
@@ -3356,7 +3361,7 @@
         </p:nvSpPr>
         <p:spPr>
           <a:xfrm>
-            <a:off x="2886068" y="5689814"/>
+            <a:off x="2736049" y="5492883"/>
             <a:ext cx="8522494" cy="891780"/>
           </a:xfrm>
           <a:prstGeom prst="rect">
@@ -3420,7 +3425,7 @@
         </p:nvSpPr>
         <p:spPr>
           <a:xfrm>
-            <a:off x="2897976" y="4612366"/>
+            <a:off x="2747957" y="4415435"/>
             <a:ext cx="8522494" cy="1015353"/>
           </a:xfrm>
           <a:prstGeom prst="rect">
@@ -3484,7 +3489,7 @@
         </p:nvSpPr>
         <p:spPr>
           <a:xfrm>
-            <a:off x="3121814" y="5819775"/>
+            <a:off x="2971795" y="5622844"/>
             <a:ext cx="1071563" cy="700087"/>
           </a:xfrm>
           <a:prstGeom prst="rect">
@@ -3532,7 +3537,7 @@
         </p:nvSpPr>
         <p:spPr>
           <a:xfrm>
-            <a:off x="4431504" y="4757737"/>
+            <a:off x="4281485" y="4560806"/>
             <a:ext cx="1071563" cy="700087"/>
           </a:xfrm>
           <a:prstGeom prst="rect">
@@ -3580,7 +3585,7 @@
         </p:nvSpPr>
         <p:spPr>
           <a:xfrm>
-            <a:off x="2897976" y="3644502"/>
+            <a:off x="2747957" y="3447571"/>
             <a:ext cx="8522494" cy="891780"/>
           </a:xfrm>
           <a:prstGeom prst="rect">
@@ -3644,7 +3649,7 @@
         </p:nvSpPr>
         <p:spPr>
           <a:xfrm>
-            <a:off x="3121813" y="3695701"/>
+            <a:off x="2971794" y="3498770"/>
             <a:ext cx="1071563" cy="700087"/>
           </a:xfrm>
           <a:prstGeom prst="rect">
@@ -3692,7 +3697,7 @@
         </p:nvSpPr>
         <p:spPr>
           <a:xfrm>
-            <a:off x="3121815" y="4757738"/>
+            <a:off x="2971796" y="4560807"/>
             <a:ext cx="1071563" cy="700087"/>
           </a:xfrm>
           <a:prstGeom prst="rect">
@@ -3740,7 +3745,7 @@
         </p:nvSpPr>
         <p:spPr>
           <a:xfrm>
-            <a:off x="4431504" y="3695701"/>
+            <a:off x="4281485" y="3498770"/>
             <a:ext cx="1071563" cy="700087"/>
           </a:xfrm>
           <a:prstGeom prst="rect">
@@ -3788,7 +3793,7 @@
         </p:nvSpPr>
         <p:spPr>
           <a:xfrm>
-            <a:off x="6927060" y="3695700"/>
+            <a:off x="6777041" y="3498769"/>
             <a:ext cx="1071563" cy="700087"/>
           </a:xfrm>
           <a:prstGeom prst="rect">
@@ -3836,7 +3841,7 @@
         </p:nvSpPr>
         <p:spPr>
           <a:xfrm>
-            <a:off x="8222461" y="3695700"/>
+            <a:off x="8072442" y="3498769"/>
             <a:ext cx="1071563" cy="700087"/>
           </a:xfrm>
           <a:prstGeom prst="rect">
@@ -3884,7 +3889,7 @@
         </p:nvSpPr>
         <p:spPr>
           <a:xfrm>
-            <a:off x="6927060" y="4757737"/>
+            <a:off x="6777041" y="4560806"/>
             <a:ext cx="1071563" cy="700087"/>
           </a:xfrm>
           <a:prstGeom prst="rect">
@@ -3932,7 +3937,7 @@
         </p:nvSpPr>
         <p:spPr>
           <a:xfrm>
-            <a:off x="8222462" y="4757736"/>
+            <a:off x="8072443" y="4560805"/>
             <a:ext cx="1071563" cy="700087"/>
           </a:xfrm>
           <a:prstGeom prst="rect">
@@ -3980,7 +3985,7 @@
         </p:nvSpPr>
         <p:spPr>
           <a:xfrm>
-            <a:off x="2774156" y="3557588"/>
+            <a:off x="2624137" y="3360657"/>
             <a:ext cx="3169444" cy="3086100"/>
           </a:xfrm>
           <a:prstGeom prst="rect">
@@ -4040,7 +4045,7 @@
         </p:nvSpPr>
         <p:spPr>
           <a:xfrm>
-            <a:off x="6573447" y="3557588"/>
+            <a:off x="6423428" y="3360657"/>
             <a:ext cx="3169444" cy="3086100"/>
           </a:xfrm>
           <a:prstGeom prst="rect">
@@ -4100,7 +4105,7 @@
         </p:nvSpPr>
         <p:spPr>
           <a:xfrm>
-            <a:off x="4276722" y="6242024"/>
+            <a:off x="4126703" y="6045093"/>
             <a:ext cx="1902624" cy="369332"/>
           </a:xfrm>
           <a:prstGeom prst="rect">
@@ -4136,7 +4141,7 @@
         </p:nvSpPr>
         <p:spPr>
           <a:xfrm>
-            <a:off x="7998623" y="6228874"/>
+            <a:off x="7848604" y="6031943"/>
             <a:ext cx="1927623" cy="369332"/>
           </a:xfrm>
           <a:prstGeom prst="rect">
@@ -4172,7 +4177,7 @@
         </p:nvSpPr>
         <p:spPr>
           <a:xfrm>
-            <a:off x="10042924" y="3871788"/>
+            <a:off x="9892905" y="3674857"/>
             <a:ext cx="1260867" cy="369332"/>
           </a:xfrm>
           <a:prstGeom prst="rect">
@@ -4208,7 +4213,7 @@
         </p:nvSpPr>
         <p:spPr>
           <a:xfrm>
-            <a:off x="10042923" y="4915972"/>
+            <a:off x="9892904" y="4719041"/>
             <a:ext cx="1260867" cy="369332"/>
           </a:xfrm>
           <a:prstGeom prst="rect">
@@ -4244,7 +4249,7 @@
         </p:nvSpPr>
         <p:spPr>
           <a:xfrm>
-            <a:off x="10036970" y="5859542"/>
+            <a:off x="9886951" y="5662611"/>
             <a:ext cx="1260867" cy="369332"/>
           </a:xfrm>
           <a:prstGeom prst="rect">
@@ -4280,7 +4285,7 @@
         </p:nvSpPr>
         <p:spPr>
           <a:xfrm>
-            <a:off x="2150269" y="3429000"/>
+            <a:off x="2000250" y="3232069"/>
             <a:ext cx="7770021" cy="3371849"/>
           </a:xfrm>
           <a:prstGeom prst="rect">
@@ -4334,7 +4339,7 @@
         </p:nvSpPr>
         <p:spPr>
           <a:xfrm>
-            <a:off x="2228400" y="3943350"/>
+            <a:off x="2078381" y="3746419"/>
             <a:ext cx="461665" cy="2185988"/>
           </a:xfrm>
           <a:prstGeom prst="rect">
@@ -4371,7 +4376,7 @@
         </p:nvSpPr>
         <p:spPr>
           <a:xfrm>
-            <a:off x="4772845" y="1703294"/>
+            <a:off x="4622826" y="1506363"/>
             <a:ext cx="2813002" cy="644885"/>
           </a:xfrm>
           <a:prstGeom prst="rect">
@@ -4448,7 +4453,7 @@
         </p:nvCxnSpPr>
         <p:spPr>
           <a:xfrm flipH="1">
-            <a:off x="4358878" y="2348179"/>
+            <a:off x="4208859" y="2151248"/>
             <a:ext cx="1820468" cy="1209409"/>
           </a:xfrm>
           <a:prstGeom prst="straightConnector1">
@@ -4491,7 +4496,7 @@
         </p:nvCxnSpPr>
         <p:spPr>
           <a:xfrm>
-            <a:off x="6179346" y="2348179"/>
+            <a:off x="6029327" y="2151248"/>
             <a:ext cx="1978823" cy="1209409"/>
           </a:xfrm>
           <a:prstGeom prst="straightConnector1">
@@ -4547,7 +4552,7 @@
         </p:blipFill>
         <p:spPr>
           <a:xfrm>
-            <a:off x="5722146" y="96918"/>
+            <a:off x="5572127" y="-100013"/>
             <a:ext cx="914400" cy="914400"/>
           </a:xfrm>
           <a:prstGeom prst="rect">
@@ -4572,7 +4577,7 @@
         </p:nvCxnSpPr>
         <p:spPr>
           <a:xfrm>
-            <a:off x="6179346" y="1011318"/>
+            <a:off x="6029327" y="814387"/>
             <a:ext cx="0" cy="691976"/>
           </a:xfrm>
           <a:prstGeom prst="straightConnector1">
@@ -4611,7 +4616,7 @@
         </p:nvSpPr>
         <p:spPr>
           <a:xfrm>
-            <a:off x="1343023" y="1516556"/>
+            <a:off x="1193004" y="1319625"/>
             <a:ext cx="10221447" cy="5440056"/>
           </a:xfrm>
           <a:prstGeom prst="rect">
@@ -4665,7 +4670,7 @@
         </p:nvSpPr>
         <p:spPr>
           <a:xfrm>
-            <a:off x="1407288" y="1590957"/>
+            <a:off x="1257269" y="1394026"/>
             <a:ext cx="1642224" cy="369332"/>
           </a:xfrm>
           <a:prstGeom prst="rect">

</xml_diff>